<commit_message>
player contact stage update
</commit_message>
<xml_diff>
--- a/2013180003 김나단 2차발표 ppt.pptx
+++ b/2013180003 김나단 2차발표 ppt.pptx
@@ -5,13 +5,14 @@
     <p:sldMasterId id="2147483648" r:id="rId1"/>
   </p:sldMasterIdLst>
   <p:notesMasterIdLst>
-    <p:notesMasterId r:id="rId6"/>
+    <p:notesMasterId r:id="rId7"/>
   </p:notesMasterIdLst>
   <p:sldIdLst>
-    <p:sldId id="256" r:id="rId2"/>
-    <p:sldId id="257" r:id="rId3"/>
-    <p:sldId id="262" r:id="rId4"/>
-    <p:sldId id="261" r:id="rId5"/>
+    <p:sldId id="263" r:id="rId2"/>
+    <p:sldId id="256" r:id="rId3"/>
+    <p:sldId id="257" r:id="rId4"/>
+    <p:sldId id="262" r:id="rId5"/>
+    <p:sldId id="261" r:id="rId6"/>
   </p:sldIdLst>
   <p:sldSz cx="12192000" cy="6858000"/>
   <p:notesSz cx="6858000" cy="9144000"/>
@@ -212,7 +213,7 @@
           <a:p>
             <a:fld id="{C258B557-FAA3-4236-B06C-C70543935B15}" type="datetimeFigureOut">
               <a:rPr lang="ko-KR" altLang="en-US" smtClean="0"/>
-              <a:t>2016-10-16</a:t>
+              <a:t>2016-10-20</a:t>
             </a:fld>
             <a:endParaRPr lang="ko-KR" altLang="en-US"/>
           </a:p>
@@ -608,7 +609,7 @@
           <a:p>
             <a:fld id="{0285A1AB-BFE4-4D4D-ADBE-154CFD289A72}" type="datetimeFigureOut">
               <a:rPr lang="ko-KR" altLang="en-US" smtClean="0"/>
-              <a:t>2016-10-16</a:t>
+              <a:t>2016-10-20</a:t>
             </a:fld>
             <a:endParaRPr lang="ko-KR" altLang="en-US"/>
           </a:p>
@@ -776,7 +777,7 @@
           <a:p>
             <a:fld id="{0285A1AB-BFE4-4D4D-ADBE-154CFD289A72}" type="datetimeFigureOut">
               <a:rPr lang="ko-KR" altLang="en-US" smtClean="0"/>
-              <a:t>2016-10-16</a:t>
+              <a:t>2016-10-20</a:t>
             </a:fld>
             <a:endParaRPr lang="ko-KR" altLang="en-US"/>
           </a:p>
@@ -954,7 +955,7 @@
           <a:p>
             <a:fld id="{0285A1AB-BFE4-4D4D-ADBE-154CFD289A72}" type="datetimeFigureOut">
               <a:rPr lang="ko-KR" altLang="en-US" smtClean="0"/>
-              <a:t>2016-10-16</a:t>
+              <a:t>2016-10-20</a:t>
             </a:fld>
             <a:endParaRPr lang="ko-KR" altLang="en-US"/>
           </a:p>
@@ -1122,7 +1123,7 @@
           <a:p>
             <a:fld id="{0285A1AB-BFE4-4D4D-ADBE-154CFD289A72}" type="datetimeFigureOut">
               <a:rPr lang="ko-KR" altLang="en-US" smtClean="0"/>
-              <a:t>2016-10-16</a:t>
+              <a:t>2016-10-20</a:t>
             </a:fld>
             <a:endParaRPr lang="ko-KR" altLang="en-US"/>
           </a:p>
@@ -1367,7 +1368,7 @@
           <a:p>
             <a:fld id="{0285A1AB-BFE4-4D4D-ADBE-154CFD289A72}" type="datetimeFigureOut">
               <a:rPr lang="ko-KR" altLang="en-US" smtClean="0"/>
-              <a:t>2016-10-16</a:t>
+              <a:t>2016-10-20</a:t>
             </a:fld>
             <a:endParaRPr lang="ko-KR" altLang="en-US"/>
           </a:p>
@@ -1596,7 +1597,7 @@
           <a:p>
             <a:fld id="{0285A1AB-BFE4-4D4D-ADBE-154CFD289A72}" type="datetimeFigureOut">
               <a:rPr lang="ko-KR" altLang="en-US" smtClean="0"/>
-              <a:t>2016-10-16</a:t>
+              <a:t>2016-10-20</a:t>
             </a:fld>
             <a:endParaRPr lang="ko-KR" altLang="en-US"/>
           </a:p>
@@ -1960,7 +1961,7 @@
           <a:p>
             <a:fld id="{0285A1AB-BFE4-4D4D-ADBE-154CFD289A72}" type="datetimeFigureOut">
               <a:rPr lang="ko-KR" altLang="en-US" smtClean="0"/>
-              <a:t>2016-10-16</a:t>
+              <a:t>2016-10-20</a:t>
             </a:fld>
             <a:endParaRPr lang="ko-KR" altLang="en-US"/>
           </a:p>
@@ -2077,7 +2078,7 @@
           <a:p>
             <a:fld id="{0285A1AB-BFE4-4D4D-ADBE-154CFD289A72}" type="datetimeFigureOut">
               <a:rPr lang="ko-KR" altLang="en-US" smtClean="0"/>
-              <a:t>2016-10-16</a:t>
+              <a:t>2016-10-20</a:t>
             </a:fld>
             <a:endParaRPr lang="ko-KR" altLang="en-US"/>
           </a:p>
@@ -2172,7 +2173,7 @@
           <a:p>
             <a:fld id="{0285A1AB-BFE4-4D4D-ADBE-154CFD289A72}" type="datetimeFigureOut">
               <a:rPr lang="ko-KR" altLang="en-US" smtClean="0"/>
-              <a:t>2016-10-16</a:t>
+              <a:t>2016-10-20</a:t>
             </a:fld>
             <a:endParaRPr lang="ko-KR" altLang="en-US"/>
           </a:p>
@@ -2447,7 +2448,7 @@
           <a:p>
             <a:fld id="{0285A1AB-BFE4-4D4D-ADBE-154CFD289A72}" type="datetimeFigureOut">
               <a:rPr lang="ko-KR" altLang="en-US" smtClean="0"/>
-              <a:t>2016-10-16</a:t>
+              <a:t>2016-10-20</a:t>
             </a:fld>
             <a:endParaRPr lang="ko-KR" altLang="en-US"/>
           </a:p>
@@ -2699,7 +2700,7 @@
           <a:p>
             <a:fld id="{0285A1AB-BFE4-4D4D-ADBE-154CFD289A72}" type="datetimeFigureOut">
               <a:rPr lang="ko-KR" altLang="en-US" smtClean="0"/>
-              <a:t>2016-10-16</a:t>
+              <a:t>2016-10-20</a:t>
             </a:fld>
             <a:endParaRPr lang="ko-KR" altLang="en-US"/>
           </a:p>
@@ -2910,7 +2911,7 @@
           <a:p>
             <a:fld id="{0285A1AB-BFE4-4D4D-ADBE-154CFD289A72}" type="datetimeFigureOut">
               <a:rPr lang="ko-KR" altLang="en-US" smtClean="0"/>
-              <a:t>2016-10-16</a:t>
+              <a:t>2016-10-20</a:t>
             </a:fld>
             <a:endParaRPr lang="ko-KR" altLang="en-US"/>
           </a:p>
@@ -3317,6 +3318,101 @@
       </p:grpSpPr>
       <p:sp>
         <p:nvSpPr>
+          <p:cNvPr id="2" name="제목 1"/>
+          <p:cNvSpPr>
+            <a:spLocks noGrp="1"/>
+          </p:cNvSpPr>
+          <p:nvPr>
+            <p:ph type="ctrTitle"/>
+          </p:nvPr>
+        </p:nvSpPr>
+        <p:spPr>
+          <a:xfrm>
+            <a:off x="1346200" y="1219199"/>
+            <a:ext cx="9144000" cy="1414463"/>
+          </a:xfrm>
+        </p:spPr>
+        <p:txBody>
+          <a:bodyPr/>
+          <a:lstStyle/>
+          <a:p>
+            <a:r>
+              <a:rPr lang="en-US" altLang="ko-KR" dirty="0"/>
+              <a:t>2013180003 </a:t>
+            </a:r>
+            <a:r>
+              <a:rPr lang="ko-KR" altLang="en-US" dirty="0"/>
+              <a:t>김나단</a:t>
+            </a:r>
+          </a:p>
+        </p:txBody>
+      </p:sp>
+      <p:sp>
+        <p:nvSpPr>
+          <p:cNvPr id="3" name="부제목 2"/>
+          <p:cNvSpPr>
+            <a:spLocks noGrp="1"/>
+          </p:cNvSpPr>
+          <p:nvPr>
+            <p:ph type="subTitle" idx="1"/>
+          </p:nvPr>
+        </p:nvSpPr>
+        <p:spPr>
+          <a:xfrm>
+            <a:off x="1143000" y="3729038"/>
+            <a:ext cx="9144000" cy="1655762"/>
+          </a:xfrm>
+        </p:spPr>
+        <p:txBody>
+          <a:bodyPr>
+            <a:normAutofit/>
+          </a:bodyPr>
+          <a:lstStyle/>
+          <a:p>
+            <a:r>
+              <a:rPr lang="en-US" altLang="ko-KR" sz="7200" dirty="0"/>
+              <a:t>2D 2</a:t>
+            </a:r>
+            <a:r>
+              <a:rPr lang="ko-KR" altLang="en-US" sz="7200" dirty="0" err="1"/>
+              <a:t>차발표</a:t>
+            </a:r>
+            <a:endParaRPr lang="ko-KR" altLang="en-US" sz="7200" dirty="0"/>
+          </a:p>
+        </p:txBody>
+      </p:sp>
+    </p:spTree>
+    <p:extLst>
+      <p:ext uri="{BB962C8B-B14F-4D97-AF65-F5344CB8AC3E}">
+        <p14:creationId xmlns:p14="http://schemas.microsoft.com/office/powerpoint/2010/main" val="4258580603"/>
+      </p:ext>
+    </p:extLst>
+  </p:cSld>
+  <p:clrMapOvr>
+    <a:masterClrMapping/>
+  </p:clrMapOvr>
+</p:sld>
+</file>
+
+<file path=ppt/slides/slide2.xml><?xml version="1.0" encoding="utf-8"?>
+<p:sld xmlns:a="http://schemas.openxmlformats.org/drawingml/2006/main" xmlns:r="http://schemas.openxmlformats.org/officeDocument/2006/relationships" xmlns:p="http://schemas.openxmlformats.org/presentationml/2006/main">
+  <p:cSld>
+    <p:spTree>
+      <p:nvGrpSpPr>
+        <p:cNvPr id="1" name=""/>
+        <p:cNvGrpSpPr/>
+        <p:nvPr/>
+      </p:nvGrpSpPr>
+      <p:grpSpPr>
+        <a:xfrm>
+          <a:off x="0" y="0"/>
+          <a:ext cx="0" cy="0"/>
+          <a:chOff x="0" y="0"/>
+          <a:chExt cx="0" cy="0"/>
+        </a:xfrm>
+      </p:grpSpPr>
+      <p:sp>
+        <p:nvSpPr>
           <p:cNvPr id="10" name="제목 1"/>
           <p:cNvSpPr txBox="1">
             <a:spLocks/>
@@ -3377,8 +3473,8 @@
         </p:nvSpPr>
         <p:spPr>
           <a:xfrm>
-            <a:off x="1116752" y="1534852"/>
-            <a:ext cx="5155579" cy="369332"/>
+            <a:off x="940421" y="1367328"/>
+            <a:ext cx="8031366" cy="461665"/>
           </a:xfrm>
           <a:prstGeom prst="rect">
             <a:avLst/>
@@ -3392,14 +3488,14 @@
           <a:lstStyle/>
           <a:p>
             <a:r>
-              <a:rPr lang="en-US" altLang="ko-KR" dirty="0"/>
-              <a:t>- </a:t>
-            </a:r>
-            <a:r>
-              <a:rPr lang="ko-KR" altLang="en-US" dirty="0"/>
+              <a:rPr lang="en-US" altLang="ko-KR" sz="2400" dirty="0"/>
+              <a:t>Concept - </a:t>
+            </a:r>
+            <a:r>
+              <a:rPr lang="ko-KR" altLang="en-US" sz="2400" dirty="0"/>
               <a:t>공룡이 비누방울을 쏘면서 적을 처치하는 게임</a:t>
             </a:r>
-            <a:endParaRPr lang="en-US" altLang="ko-KR" dirty="0"/>
+            <a:endParaRPr lang="en-US" altLang="ko-KR" sz="2400" dirty="0"/>
           </a:p>
         </p:txBody>
       </p:sp>
@@ -3425,8 +3521,8 @@
         </p:blipFill>
         <p:spPr>
           <a:xfrm>
-            <a:off x="2402798" y="2071708"/>
-            <a:ext cx="8841995" cy="4293448"/>
+            <a:off x="4432300" y="2198708"/>
+            <a:ext cx="7396693" cy="4293448"/>
           </a:xfrm>
           <a:prstGeom prst="rect">
             <a:avLst/>
@@ -3443,93 +3539,10 @@
   <p:clrMapOvr>
     <a:masterClrMapping/>
   </p:clrMapOvr>
-  <p:timing>
-    <p:tnLst>
-      <p:par>
-        <p:cTn id="1" dur="indefinite" restart="never" nodeType="tmRoot">
-          <p:childTnLst>
-            <p:seq concurrent="1" nextAc="seek">
-              <p:cTn id="2" dur="indefinite" nodeType="mainSeq">
-                <p:childTnLst>
-                  <p:par>
-                    <p:cTn id="3" fill="hold">
-                      <p:stCondLst>
-                        <p:cond delay="indefinite"/>
-                      </p:stCondLst>
-                      <p:childTnLst>
-                        <p:par>
-                          <p:cTn id="4" fill="hold">
-                            <p:stCondLst>
-                              <p:cond delay="0"/>
-                            </p:stCondLst>
-                            <p:childTnLst>
-                              <p:par>
-                                <p:cTn id="5" presetID="14" presetClass="entr" presetSubtype="10" fill="hold" nodeType="clickEffect">
-                                  <p:stCondLst>
-                                    <p:cond delay="0"/>
-                                  </p:stCondLst>
-                                  <p:childTnLst>
-                                    <p:set>
-                                      <p:cBhvr>
-                                        <p:cTn id="6" dur="1" fill="hold">
-                                          <p:stCondLst>
-                                            <p:cond delay="0"/>
-                                          </p:stCondLst>
-                                        </p:cTn>
-                                        <p:tgtEl>
-                                          <p:spTgt spid="16"/>
-                                        </p:tgtEl>
-                                        <p:attrNameLst>
-                                          <p:attrName>style.visibility</p:attrName>
-                                        </p:attrNameLst>
-                                      </p:cBhvr>
-                                      <p:to>
-                                        <p:strVal val="visible"/>
-                                      </p:to>
-                                    </p:set>
-                                    <p:animEffect transition="in" filter="randombar(horizontal)">
-                                      <p:cBhvr>
-                                        <p:cTn id="7" dur="500"/>
-                                        <p:tgtEl>
-                                          <p:spTgt spid="16"/>
-                                        </p:tgtEl>
-                                      </p:cBhvr>
-                                    </p:animEffect>
-                                  </p:childTnLst>
-                                </p:cTn>
-                              </p:par>
-                            </p:childTnLst>
-                          </p:cTn>
-                        </p:par>
-                      </p:childTnLst>
-                    </p:cTn>
-                  </p:par>
-                </p:childTnLst>
-              </p:cTn>
-              <p:prevCondLst>
-                <p:cond evt="onPrev" delay="0">
-                  <p:tgtEl>
-                    <p:sldTgt/>
-                  </p:tgtEl>
-                </p:cond>
-              </p:prevCondLst>
-              <p:nextCondLst>
-                <p:cond evt="onNext" delay="0">
-                  <p:tgtEl>
-                    <p:sldTgt/>
-                  </p:tgtEl>
-                </p:cond>
-              </p:nextCondLst>
-            </p:seq>
-          </p:childTnLst>
-        </p:cTn>
-      </p:par>
-    </p:tnLst>
-  </p:timing>
 </p:sld>
 </file>
 
-<file path=ppt/slides/slide2.xml><?xml version="1.0" encoding="utf-8"?>
+<file path=ppt/slides/slide3.xml><?xml version="1.0" encoding="utf-8"?>
 <p:sld xmlns:a="http://schemas.openxmlformats.org/drawingml/2006/main" xmlns:r="http://schemas.openxmlformats.org/officeDocument/2006/relationships" xmlns:p="http://schemas.openxmlformats.org/presentationml/2006/main">
   <p:cSld>
     <p:spTree>
@@ -4288,7 +4301,7 @@
 </p:sld>
 </file>
 
-<file path=ppt/slides/slide3.xml><?xml version="1.0" encoding="utf-8"?>
+<file path=ppt/slides/slide4.xml><?xml version="1.0" encoding="utf-8"?>
 <p:sld xmlns:a="http://schemas.openxmlformats.org/drawingml/2006/main" xmlns:r="http://schemas.openxmlformats.org/officeDocument/2006/relationships" xmlns:p="http://schemas.openxmlformats.org/presentationml/2006/main">
   <p:cSld>
     <p:spTree>
@@ -4315,7 +4328,7 @@
             <p:ph idx="1"/>
             <p:extLst>
               <p:ext uri="{D42A27DB-BD31-4B8C-83A1-F6EECF244321}">
-                <p14:modId xmlns:p14="http://schemas.microsoft.com/office/powerpoint/2010/main" val="1383240001"/>
+                <p14:modId xmlns:p14="http://schemas.microsoft.com/office/powerpoint/2010/main" val="3231333841"/>
               </p:ext>
             </p:extLst>
           </p:nvPr>
@@ -4823,15 +4836,27 @@
                         <a:t> </a:t>
                       </a:r>
                       <a:r>
-                        <a:rPr lang="en-US" altLang="ko-KR" sz="1050" dirty="0"/>
-                        <a:t>(50% </a:t>
-                      </a:r>
-                      <a:r>
-                        <a:rPr lang="ko-KR" altLang="en-US" sz="1050" dirty="0"/>
+                        <a:rPr lang="ko-KR" altLang="en-US" sz="1050" baseline="0" dirty="0"/>
+                        <a:t>현재 </a:t>
+                      </a:r>
+                      <a:r>
+                        <a:rPr lang="en-US" altLang="ko-KR" sz="1050" baseline="0" dirty="0"/>
+                        <a:t>2 </a:t>
+                      </a:r>
+                      <a:r>
+                        <a:rPr lang="ko-KR" altLang="en-US" sz="1050" baseline="0" dirty="0"/>
+                        <a:t>스테이지 완료</a:t>
+                      </a:r>
+                      <a:r>
+                        <a:rPr lang="en-US" altLang="ko-KR" sz="1050" baseline="0" dirty="0"/>
+                        <a:t> (50%</a:t>
+                      </a:r>
+                      <a:r>
+                        <a:rPr lang="ko-KR" altLang="en-US" sz="1050" baseline="0" dirty="0"/>
                         <a:t>완료</a:t>
                       </a:r>
                       <a:r>
-                        <a:rPr lang="en-US" altLang="ko-KR" sz="1050" dirty="0"/>
+                        <a:rPr lang="en-US" altLang="ko-KR" sz="1050" baseline="0" dirty="0"/>
                         <a:t>)</a:t>
                       </a:r>
                       <a:endParaRPr lang="ko-KR" altLang="en-US" sz="1050" dirty="0"/>
@@ -4938,6 +4963,84 @@
                       <a:pPr marL="228600" indent="-228600" latinLnBrk="1">
                         <a:buAutoNum type="arabicPeriod"/>
                       </a:pPr>
+                      <a:r>
+                        <a:rPr lang="ko-KR" altLang="en-US" sz="1050" dirty="0"/>
+                        <a:t>스테이지</a:t>
+                      </a:r>
+                      <a:r>
+                        <a:rPr lang="ko-KR" altLang="en-US" sz="1050" baseline="0" dirty="0"/>
+                        <a:t> 데이터 읽어 들여온 뒤 이미지 출력 완료</a:t>
+                      </a:r>
+                      <a:endParaRPr lang="en-US" altLang="ko-KR" sz="1050" baseline="0" dirty="0"/>
+                    </a:p>
+                    <a:p>
+                      <a:pPr marL="228600" indent="-228600" latinLnBrk="1">
+                        <a:buAutoNum type="arabicPeriod"/>
+                      </a:pPr>
+                      <a:r>
+                        <a:rPr lang="ko-KR" altLang="en-US" sz="1050" dirty="0"/>
+                        <a:t>스테이지에 포함된 몬스터 종류</a:t>
+                      </a:r>
+                      <a:r>
+                        <a:rPr lang="en-US" altLang="ko-KR" sz="1050" dirty="0"/>
+                        <a:t>,</a:t>
+                      </a:r>
+                      <a:r>
+                        <a:rPr lang="en-US" altLang="ko-KR" sz="1050" baseline="0" dirty="0"/>
+                        <a:t> </a:t>
+                      </a:r>
+                      <a:r>
+                        <a:rPr lang="ko-KR" altLang="en-US" sz="1050" baseline="0" dirty="0"/>
+                        <a:t>위치 읽은 뒤 스테이지 </a:t>
+                      </a:r>
+                      <a:r>
+                        <a:rPr lang="ko-KR" altLang="en-US" sz="1050" baseline="0" dirty="0" err="1"/>
+                        <a:t>시작시</a:t>
+                      </a:r>
+                      <a:r>
+                        <a:rPr lang="ko-KR" altLang="en-US" sz="1050" baseline="0" dirty="0"/>
+                        <a:t> 설정 완료</a:t>
+                      </a:r>
+                      <a:endParaRPr lang="en-US" altLang="ko-KR" sz="1050" baseline="0" dirty="0"/>
+                    </a:p>
+                    <a:p>
+                      <a:pPr marL="228600" indent="-228600" latinLnBrk="1">
+                        <a:buAutoNum type="arabicPeriod"/>
+                      </a:pPr>
+                      <a:r>
+                        <a:rPr lang="ko-KR" altLang="en-US" sz="1050" dirty="0"/>
+                        <a:t>스테이지</a:t>
+                      </a:r>
+                      <a:r>
+                        <a:rPr lang="en-US" altLang="ko-KR" sz="1050" dirty="0"/>
+                        <a:t>&lt;-&gt;</a:t>
+                      </a:r>
+                      <a:r>
+                        <a:rPr lang="ko-KR" altLang="en-US" sz="1050" dirty="0"/>
+                        <a:t>플레이어 충돌구현 완료</a:t>
+                      </a:r>
+                      <a:endParaRPr lang="en-US" altLang="ko-KR" sz="1050" dirty="0"/>
+                    </a:p>
+                    <a:p>
+                      <a:pPr marL="228600" indent="-228600" latinLnBrk="1">
+                        <a:buAutoNum type="arabicPeriod"/>
+                      </a:pPr>
+                      <a:r>
+                        <a:rPr lang="ko-KR" altLang="en-US" sz="1050" dirty="0"/>
+                        <a:t>나머지 </a:t>
+                      </a:r>
+                      <a:r>
+                        <a:rPr lang="ko-KR" altLang="en-US" sz="1050" dirty="0" err="1"/>
+                        <a:t>적들간의</a:t>
+                      </a:r>
+                      <a:r>
+                        <a:rPr lang="ko-KR" altLang="en-US" sz="1050" dirty="0"/>
+                        <a:t> 충돌 </a:t>
+                      </a:r>
+                      <a:r>
+                        <a:rPr lang="ko-KR" altLang="en-US" sz="1050" dirty="0" err="1"/>
+                        <a:t>미구현</a:t>
+                      </a:r>
                       <a:endParaRPr lang="ko-KR" altLang="en-US" sz="1050" dirty="0"/>
                     </a:p>
                   </a:txBody>
@@ -5493,6 +5596,53 @@
           </a:p>
         </p:txBody>
       </p:sp>
+      <p:sp>
+        <p:nvSpPr>
+          <p:cNvPr id="2" name="화살표: 오른쪽 1"/>
+          <p:cNvSpPr/>
+          <p:nvPr/>
+        </p:nvSpPr>
+        <p:spPr>
+          <a:xfrm>
+            <a:off x="139700" y="3124200"/>
+            <a:ext cx="863600" cy="863600"/>
+          </a:xfrm>
+          <a:prstGeom prst="rightArrow">
+            <a:avLst/>
+          </a:prstGeom>
+          <a:solidFill>
+            <a:srgbClr val="FF0000"/>
+          </a:solidFill>
+        </p:spPr>
+        <p:style>
+          <a:lnRef idx="2">
+            <a:schemeClr val="accent1">
+              <a:shade val="50000"/>
+            </a:schemeClr>
+          </a:lnRef>
+          <a:fillRef idx="1">
+            <a:schemeClr val="accent1"/>
+          </a:fillRef>
+          <a:effectRef idx="0">
+            <a:schemeClr val="accent1"/>
+          </a:effectRef>
+          <a:fontRef idx="minor">
+            <a:schemeClr val="lt1"/>
+          </a:fontRef>
+        </p:style>
+        <p:txBody>
+          <a:bodyPr rtlCol="0" anchor="ctr"/>
+          <a:lstStyle/>
+          <a:p>
+            <a:pPr algn="ctr"/>
+            <a:r>
+              <a:rPr lang="ko-KR" altLang="en-US" sz="1200"/>
+              <a:t>진행중</a:t>
+            </a:r>
+            <a:endParaRPr lang="ko-KR" altLang="en-US" sz="1200" dirty="0"/>
+          </a:p>
+        </p:txBody>
+      </p:sp>
     </p:spTree>
     <p:extLst>
       <p:ext uri="{BB962C8B-B14F-4D97-AF65-F5344CB8AC3E}">
@@ -5506,7 +5656,7 @@
 </p:sld>
 </file>
 
-<file path=ppt/slides/slide4.xml><?xml version="1.0" encoding="utf-8"?>
+<file path=ppt/slides/slide5.xml><?xml version="1.0" encoding="utf-8"?>
 <p:sld xmlns:a="http://schemas.openxmlformats.org/drawingml/2006/main" xmlns:r="http://schemas.openxmlformats.org/officeDocument/2006/relationships" xmlns:p="http://schemas.openxmlformats.org/presentationml/2006/main">
   <p:cSld>
     <p:spTree>
@@ -5533,7 +5683,12 @@
             <p:ph type="title"/>
           </p:nvPr>
         </p:nvSpPr>
-        <p:spPr/>
+        <p:spPr>
+          <a:xfrm>
+            <a:off x="838200" y="365125"/>
+            <a:ext cx="10515600" cy="1044575"/>
+          </a:xfrm>
+        </p:spPr>
         <p:txBody>
           <a:bodyPr/>
           <a:lstStyle/>
@@ -5555,14 +5710,14 @@
             <p:ph idx="1"/>
             <p:extLst>
               <p:ext uri="{D42A27DB-BD31-4B8C-83A1-F6EECF244321}">
-                <p14:modId xmlns:p14="http://schemas.microsoft.com/office/powerpoint/2010/main" val="3552525905"/>
+                <p14:modId xmlns:p14="http://schemas.microsoft.com/office/powerpoint/2010/main" val="4270146339"/>
               </p:ext>
             </p:extLst>
           </p:nvPr>
         </p:nvGraphicFramePr>
         <p:xfrm>
-          <a:off x="838200" y="1825625"/>
-          <a:ext cx="10515600" cy="4061827"/>
+          <a:off x="838200" y="1409703"/>
+          <a:ext cx="10515600" cy="4787896"/>
         </p:xfrm>
         <a:graphic>
           <a:graphicData uri="http://schemas.openxmlformats.org/drawingml/2006/table">
@@ -5586,7 +5741,7 @@
                   </a:extLst>
                 </a:gridCol>
               </a:tblGrid>
-              <a:tr h="580261">
+              <a:tr h="772496">
                 <a:tc>
                   <a:txBody>
                     <a:bodyPr/>
@@ -5621,7 +5776,7 @@
                   </a:ext>
                 </a:extLst>
               </a:tr>
-              <a:tr h="580261">
+              <a:tr h="651950">
                 <a:tc>
                   <a:txBody>
                     <a:bodyPr/>
@@ -5657,7 +5812,7 @@
                   </a:ext>
                 </a:extLst>
               </a:tr>
-              <a:tr h="1160522">
+              <a:tr h="640287">
                 <a:tc>
                   <a:txBody>
                     <a:bodyPr/>
@@ -5693,7 +5848,7 @@
                   </a:ext>
                 </a:extLst>
               </a:tr>
-              <a:tr h="1160522">
+              <a:tr h="583146">
                 <a:tc>
                   <a:txBody>
                     <a:bodyPr/>
@@ -5715,7 +5870,7 @@
                     <a:p>
                       <a:pPr algn="ctr" latinLnBrk="1"/>
                       <a:r>
-                        <a:rPr lang="en-US" altLang="ko-KR" sz="2000"/>
+                        <a:rPr lang="en-US" altLang="ko-KR" sz="2000" dirty="0"/>
                         <a:t>B</a:t>
                       </a:r>
                       <a:endParaRPr lang="ko-KR" altLang="en-US" sz="2000" dirty="0"/>
@@ -5729,7 +5884,7 @@
                   </a:ext>
                 </a:extLst>
               </a:tr>
-              <a:tr h="580261">
+              <a:tr h="481127">
                 <a:tc>
                   <a:txBody>
                     <a:bodyPr/>
@@ -5752,7 +5907,7 @@
                       <a:pPr algn="ctr" latinLnBrk="1"/>
                       <a:r>
                         <a:rPr lang="en-US" altLang="ko-KR" sz="2000" dirty="0"/>
-                        <a:t>B</a:t>
+                        <a:t>A</a:t>
                       </a:r>
                       <a:endParaRPr lang="ko-KR" altLang="en-US" sz="2000" dirty="0"/>
                     </a:p>
@@ -5762,6 +5917,119 @@
                 <a:extLst>
                   <a:ext uri="{0D108BD9-81ED-4DB2-BD59-A6C34878D82A}">
                     <a16:rowId xmlns:a16="http://schemas.microsoft.com/office/drawing/2014/main" val="2876326181"/>
+                  </a:ext>
+                </a:extLst>
+              </a:tr>
+              <a:tr h="603870">
+                <a:tc>
+                  <a:txBody>
+                    <a:bodyPr/>
+                    <a:lstStyle/>
+                    <a:p>
+                      <a:pPr latinLnBrk="1"/>
+                      <a:r>
+                        <a:rPr lang="ko-KR" altLang="en-US" sz="2000" dirty="0"/>
+                        <a:t>계획대로 됐는가</a:t>
+                      </a:r>
+                    </a:p>
+                  </a:txBody>
+                  <a:tcPr/>
+                </a:tc>
+                <a:tc>
+                  <a:txBody>
+                    <a:bodyPr/>
+                    <a:lstStyle/>
+                    <a:p>
+                      <a:pPr algn="ctr" latinLnBrk="1"/>
+                      <a:r>
+                        <a:rPr lang="en-US" altLang="ko-KR" sz="2000" dirty="0"/>
+                        <a:t>A</a:t>
+                      </a:r>
+                      <a:endParaRPr lang="ko-KR" altLang="en-US" sz="2000" dirty="0"/>
+                    </a:p>
+                  </a:txBody>
+                  <a:tcPr/>
+                </a:tc>
+                <a:extLst>
+                  <a:ext uri="{0D108BD9-81ED-4DB2-BD59-A6C34878D82A}">
+                    <a16:rowId xmlns:a16="http://schemas.microsoft.com/office/drawing/2014/main" val="3435928374"/>
+                  </a:ext>
+                </a:extLst>
+              </a:tr>
+              <a:tr h="527510">
+                <a:tc>
+                  <a:txBody>
+                    <a:bodyPr/>
+                    <a:lstStyle/>
+                    <a:p>
+                      <a:pPr latinLnBrk="1"/>
+                      <a:r>
+                        <a:rPr lang="ko-KR" altLang="en-US" sz="2000" dirty="0"/>
+                        <a:t>게임 실행이 잘 되었는가</a:t>
+                      </a:r>
+                    </a:p>
+                  </a:txBody>
+                  <a:tcPr/>
+                </a:tc>
+                <a:tc>
+                  <a:txBody>
+                    <a:bodyPr/>
+                    <a:lstStyle/>
+                    <a:p>
+                      <a:pPr algn="ctr" latinLnBrk="1"/>
+                      <a:r>
+                        <a:rPr lang="en-US" altLang="ko-KR" sz="2000" dirty="0"/>
+                        <a:t>A</a:t>
+                      </a:r>
+                      <a:endParaRPr lang="ko-KR" altLang="en-US" sz="2000" dirty="0"/>
+                    </a:p>
+                  </a:txBody>
+                  <a:tcPr/>
+                </a:tc>
+                <a:extLst>
+                  <a:ext uri="{0D108BD9-81ED-4DB2-BD59-A6C34878D82A}">
+                    <a16:rowId xmlns:a16="http://schemas.microsoft.com/office/drawing/2014/main" val="3177488173"/>
+                  </a:ext>
+                </a:extLst>
+              </a:tr>
+              <a:tr h="527510">
+                <a:tc>
+                  <a:txBody>
+                    <a:bodyPr/>
+                    <a:lstStyle/>
+                    <a:p>
+                      <a:pPr latinLnBrk="1"/>
+                      <a:r>
+                        <a:rPr lang="ko-KR" altLang="en-US" sz="2000" dirty="0"/>
+                        <a:t>동영상에서 소리 화면</a:t>
+                      </a:r>
+                      <a:r>
+                        <a:rPr lang="ko-KR" altLang="en-US" sz="2000" baseline="0" dirty="0"/>
+                        <a:t> 상태가 양호한가</a:t>
+                      </a:r>
+                      <a:endParaRPr lang="ko-KR" altLang="en-US" sz="2000" dirty="0"/>
+                    </a:p>
+                  </a:txBody>
+                  <a:tcPr/>
+                </a:tc>
+                <a:tc>
+                  <a:txBody>
+                    <a:bodyPr/>
+                    <a:lstStyle/>
+                    <a:p>
+                      <a:pPr algn="ctr" latinLnBrk="1"/>
+                      <a:r>
+                        <a:rPr lang="en-US" altLang="ko-KR" sz="2000" dirty="0"/>
+                        <a:t>A</a:t>
+                      </a:r>
+                      <a:endParaRPr lang="ko-KR" altLang="en-US" sz="2000" dirty="0"/>
+                    </a:p>
+                  </a:txBody>
+                  <a:tcPr/>
+                </a:tc>
+                <a:extLst>
+                  <a:ext uri="{0D108BD9-81ED-4DB2-BD59-A6C34878D82A}">
+                    <a16:rowId xmlns:a16="http://schemas.microsoft.com/office/drawing/2014/main" val="78628941"/>
                   </a:ext>
                 </a:extLst>
               </a:tr>

</xml_diff>

<commit_message>
debug player contact stages
</commit_message>
<xml_diff>
--- a/2013180003 김나단 2차발표 ppt.pptx
+++ b/2013180003 김나단 2차발표 ppt.pptx
@@ -5,14 +5,15 @@
     <p:sldMasterId id="2147483648" r:id="rId1"/>
   </p:sldMasterIdLst>
   <p:notesMasterIdLst>
-    <p:notesMasterId r:id="rId7"/>
+    <p:notesMasterId r:id="rId8"/>
   </p:notesMasterIdLst>
   <p:sldIdLst>
     <p:sldId id="263" r:id="rId2"/>
     <p:sldId id="256" r:id="rId3"/>
     <p:sldId id="257" r:id="rId4"/>
     <p:sldId id="262" r:id="rId5"/>
-    <p:sldId id="261" r:id="rId6"/>
+    <p:sldId id="264" r:id="rId6"/>
+    <p:sldId id="261" r:id="rId7"/>
   </p:sldIdLst>
   <p:sldSz cx="12192000" cy="6858000"/>
   <p:notesSz cx="6858000" cy="9144000"/>
@@ -5591,7 +5592,7 @@
           <a:p>
             <a:r>
               <a:rPr lang="ko-KR" altLang="en-US" dirty="0"/>
-              <a:t>개발 계획 대비 진행 상황</a:t>
+              <a:t>진행 상황</a:t>
             </a:r>
           </a:p>
         </p:txBody>
@@ -5657,6 +5658,100 @@
 </file>
 
 <file path=ppt/slides/slide5.xml><?xml version="1.0" encoding="utf-8"?>
+<p:sld xmlns:a="http://schemas.openxmlformats.org/drawingml/2006/main" xmlns:r="http://schemas.openxmlformats.org/officeDocument/2006/relationships" xmlns:p="http://schemas.openxmlformats.org/presentationml/2006/main">
+  <p:cSld>
+    <p:spTree>
+      <p:nvGrpSpPr>
+        <p:cNvPr id="1" name=""/>
+        <p:cNvGrpSpPr/>
+        <p:nvPr/>
+      </p:nvGrpSpPr>
+      <p:grpSpPr>
+        <a:xfrm>
+          <a:off x="0" y="0"/>
+          <a:ext cx="0" cy="0"/>
+          <a:chOff x="0" y="0"/>
+          <a:chExt cx="0" cy="0"/>
+        </a:xfrm>
+      </p:grpSpPr>
+      <p:sp>
+        <p:nvSpPr>
+          <p:cNvPr id="2" name="제목 1"/>
+          <p:cNvSpPr>
+            <a:spLocks noGrp="1"/>
+          </p:cNvSpPr>
+          <p:nvPr>
+            <p:ph type="title"/>
+          </p:nvPr>
+        </p:nvSpPr>
+        <p:spPr>
+          <a:xfrm>
+            <a:off x="838200" y="365125"/>
+            <a:ext cx="10515600" cy="498475"/>
+          </a:xfrm>
+        </p:spPr>
+        <p:txBody>
+          <a:bodyPr>
+            <a:normAutofit fontScale="90000"/>
+          </a:bodyPr>
+          <a:lstStyle/>
+          <a:p>
+            <a:r>
+              <a:rPr lang="en-US" altLang="ko-KR" dirty="0" err="1"/>
+              <a:t>Github</a:t>
+            </a:r>
+            <a:r>
+              <a:rPr lang="en-US" altLang="ko-KR" dirty="0"/>
+              <a:t> commit Graph</a:t>
+            </a:r>
+            <a:endParaRPr lang="ko-KR" altLang="en-US" dirty="0"/>
+          </a:p>
+        </p:txBody>
+      </p:sp>
+      <p:pic>
+        <p:nvPicPr>
+          <p:cNvPr id="4" name="그림 3"/>
+          <p:cNvPicPr>
+            <a:picLocks noChangeAspect="1"/>
+          </p:cNvPicPr>
+          <p:nvPr/>
+        </p:nvPicPr>
+        <p:blipFill>
+          <a:blip r:embed="rId2">
+            <a:extLst>
+              <a:ext uri="{28A0092B-C50C-407E-A947-70E740481C1C}">
+                <a14:useLocalDpi xmlns:a14="http://schemas.microsoft.com/office/drawing/2010/main" val="0"/>
+              </a:ext>
+            </a:extLst>
+          </a:blip>
+          <a:stretch>
+            <a:fillRect/>
+          </a:stretch>
+        </p:blipFill>
+        <p:spPr>
+          <a:xfrm>
+            <a:off x="0" y="863600"/>
+            <a:ext cx="12191999" cy="5994400"/>
+          </a:xfrm>
+          <a:prstGeom prst="rect">
+            <a:avLst/>
+          </a:prstGeom>
+        </p:spPr>
+      </p:pic>
+    </p:spTree>
+    <p:extLst>
+      <p:ext uri="{BB962C8B-B14F-4D97-AF65-F5344CB8AC3E}">
+        <p14:creationId xmlns:p14="http://schemas.microsoft.com/office/powerpoint/2010/main" val="1806323234"/>
+      </p:ext>
+    </p:extLst>
+  </p:cSld>
+  <p:clrMapOvr>
+    <a:masterClrMapping/>
+  </p:clrMapOvr>
+</p:sld>
+</file>
+
+<file path=ppt/slides/slide6.xml><?xml version="1.0" encoding="utf-8"?>
 <p:sld xmlns:a="http://schemas.openxmlformats.org/drawingml/2006/main" xmlns:r="http://schemas.openxmlformats.org/officeDocument/2006/relationships" xmlns:p="http://schemas.openxmlformats.org/presentationml/2006/main">
   <p:cSld>
     <p:spTree>

</xml_diff>